<commit_message>
Few modifications to the presentation
</commit_message>
<xml_diff>
--- a/doc/presentation.pptx
+++ b/doc/presentation.pptx
@@ -3810,11 +3810,7 @@
             </a:br>
             <a:r>
               <a:rPr lang="en-US" dirty="0" smtClean="0"/>
-              <a:t>Spring </a:t>
-            </a:r>
-            <a:r>
-              <a:rPr lang="en-US" dirty="0" smtClean="0"/>
-              <a:t>2009</a:t>
+              <a:t>Spring 2009</a:t>
             </a:r>
             <a:endParaRPr lang="en-US" dirty="0"/>
           </a:p>
@@ -4292,11 +4288,7 @@
           <a:p>
             <a:r>
               <a:rPr lang="en-US" b="1" dirty="0" smtClean="0"/>
-              <a:t>Mine (1</a:t>
-            </a:r>
-            <a:r>
-              <a:rPr lang="en-US" b="1" dirty="0" smtClean="0"/>
-              <a:t>/2)</a:t>
+              <a:t>Mine (1/2)</a:t>
             </a:r>
             <a:endParaRPr lang="en-US" b="1" dirty="0"/>
           </a:p>
@@ -4319,13 +4311,8 @@
           <a:p>
             <a:r>
               <a:rPr lang="en-US" dirty="0" smtClean="0"/>
-              <a:t>Apply K-Mean (unsupervised learning) to find </a:t>
-            </a:r>
-            <a:r>
-              <a:rPr lang="en-US" dirty="0" smtClean="0"/>
-              <a:t>clusters</a:t>
-            </a:r>
-            <a:endParaRPr lang="en-US" dirty="0" smtClean="0"/>
+              <a:t>Apply K-Mean (unsupervised learning) to find clusters</a:t>
+            </a:r>
           </a:p>
         </p:txBody>
       </p:sp>
@@ -4515,11 +4502,7 @@
           <a:p>
             <a:r>
               <a:rPr lang="en-US" b="1" dirty="0" smtClean="0"/>
-              <a:t>Mine </a:t>
-            </a:r>
-            <a:r>
-              <a:rPr lang="en-US" b="1" dirty="0" smtClean="0"/>
-              <a:t>(2/2)</a:t>
+              <a:t>Mine (2/2)</a:t>
             </a:r>
             <a:endParaRPr lang="en-US" b="1" dirty="0"/>
           </a:p>
@@ -4767,42 +4750,72 @@
         <p:spPr/>
         <p:txBody>
           <a:bodyPr>
-            <a:normAutofit fontScale="92500" lnSpcReduction="10000"/>
+            <a:normAutofit fontScale="92500" lnSpcReduction="20000"/>
           </a:bodyPr>
           <a:lstStyle/>
           <a:p>
             <a:r>
               <a:rPr lang="en-US" dirty="0" smtClean="0"/>
-              <a:t>Speed and Engine speed are obviously correlated hence diagrams that shows clusters </a:t>
+              <a:t>Three clusters</a:t>
             </a:r>
             <a:r>
               <a:rPr lang="en-US" dirty="0" smtClean="0"/>
-              <a:t>distribution over these attributes are very similar</a:t>
-            </a:r>
-          </a:p>
-          <a:p>
+              <a:t> representing </a:t>
+            </a:r>
             <a:r>
               <a:rPr lang="en-US" dirty="0" smtClean="0"/>
-              <a:t>Three clusters basically represent a logical subdivision considering the real life</a:t>
-            </a:r>
-          </a:p>
-          <a:p>
+              <a:t>a logical subdivision considering the real </a:t>
+            </a:r>
             <a:r>
               <a:rPr lang="en-US" dirty="0" smtClean="0"/>
-              <a:t>Every vehicle has an equal distribution over all three clusters</a:t>
-            </a:r>
-            <a:endParaRPr lang="en-US" dirty="0" smtClean="0"/>
+              <a:t>life driving style</a:t>
+            </a:r>
           </a:p>
           <a:p>
             <a:r>
               <a:rPr lang="en-US" dirty="0" smtClean="0"/>
-              <a:t>Driving style is not affected by the position of the vehicle over the city since all clusters are </a:t>
+              <a:t>Speed </a:t>
             </a:r>
             <a:r>
               <a:rPr lang="en-US" dirty="0" smtClean="0"/>
-              <a:t>equally spread over GPS coordinates</a:t>
-            </a:r>
-            <a:endParaRPr lang="en-US" dirty="0" smtClean="0"/>
+              <a:t>and Engine speed are obviously correlated hence diagrams</a:t>
+            </a:r>
+            <a:r>
+              <a:rPr lang="en-US" dirty="0" smtClean="0"/>
+              <a:t> showing </a:t>
+            </a:r>
+            <a:r>
+              <a:rPr lang="en-US" dirty="0" smtClean="0"/>
+              <a:t>clusters distribution over these attributes are very </a:t>
+            </a:r>
+            <a:r>
+              <a:rPr lang="en-US" dirty="0" smtClean="0"/>
+              <a:t>similar in shape and density</a:t>
+            </a:r>
+          </a:p>
+          <a:p>
+            <a:r>
+              <a:rPr lang="en-US" dirty="0" smtClean="0"/>
+              <a:t>Every </a:t>
+            </a:r>
+            <a:r>
+              <a:rPr lang="en-US" dirty="0" smtClean="0"/>
+              <a:t>vehicle has an equal distribution over all three clusters</a:t>
+            </a:r>
+          </a:p>
+          <a:p>
+            <a:r>
+              <a:rPr lang="en-US" dirty="0" smtClean="0"/>
+              <a:t>Driving style is not affected by the position of the vehicle</a:t>
+            </a:r>
+            <a:r>
+              <a:rPr lang="en-US" dirty="0" smtClean="0"/>
+              <a:t> since </a:t>
+            </a:r>
+            <a:r>
+              <a:rPr lang="en-US" dirty="0" smtClean="0"/>
+              <a:t>all clusters are equally spread over GPS coordinates</a:t>
+            </a:r>
           </a:p>
         </p:txBody>
       </p:sp>

</xml_diff>